<commit_message>
Created a simple map template for tracking the drone's location
</commit_message>
<xml_diff>
--- a/Frontiers of Robotics Research/Project/msc project face recognition results table.pptx
+++ b/Frontiers of Robotics Research/Project/msc project face recognition results table.pptx
@@ -4405,10 +4405,10 @@
         </p:nvGrpSpPr>
         <p:grpSpPr>
           <a:xfrm>
-            <a:off x="1762083" y="146146"/>
-            <a:ext cx="8142610" cy="4822189"/>
+            <a:off x="2400605" y="157919"/>
+            <a:ext cx="7979460" cy="4822189"/>
             <a:chOff x="1149867" y="212862"/>
-            <a:chExt cx="8142610" cy="4822189"/>
+            <a:chExt cx="7979460" cy="4822189"/>
           </a:xfrm>
         </p:grpSpPr>
         <p:grpSp>
@@ -4931,10 +4931,10 @@
           </p:nvGrpSpPr>
           <p:grpSpPr>
             <a:xfrm>
-              <a:off x="8075891" y="4570936"/>
-              <a:ext cx="1216586" cy="271206"/>
-              <a:chOff x="8075891" y="223651"/>
-              <a:chExt cx="1216586" cy="271206"/>
+              <a:off x="7912741" y="4585942"/>
+              <a:ext cx="1216586" cy="290737"/>
+              <a:chOff x="7912741" y="238657"/>
+              <a:chExt cx="1216586" cy="290737"/>
             </a:xfrm>
           </p:grpSpPr>
           <p:sp>
@@ -4951,7 +4951,7 @@
             </p:nvSpPr>
             <p:spPr>
               <a:xfrm>
-                <a:off x="8075891" y="223651"/>
+                <a:off x="7912741" y="238657"/>
                 <a:ext cx="1216586" cy="246221"/>
               </a:xfrm>
               <a:prstGeom prst="rect">
@@ -4986,7 +4986,7 @@
             </p:nvSpPr>
             <p:spPr>
               <a:xfrm>
-                <a:off x="8388978" y="436291"/>
+                <a:off x="8107691" y="470828"/>
                 <a:ext cx="51372" cy="58566"/>
               </a:xfrm>
               <a:prstGeom prst="ellipse">
@@ -5329,12 +5329,9 @@
 </file>
 
 <file path=customXml/item1.xml><?xml version="1.0" encoding="utf-8"?>
-<?mso-contentType ?>
-<FormTemplates xmlns="http://schemas.microsoft.com/sharepoint/v3/contenttype/forms">
-  <Display>DocumentLibraryForm</Display>
-  <Edit>DocumentLibraryForm</Edit>
-  <New>DocumentLibraryForm</New>
-</FormTemplates>
+<p:properties xmlns:p="http://schemas.microsoft.com/office/2006/metadata/properties" xmlns:xsi="http://www.w3.org/2001/XMLSchema-instance" xmlns:pc="http://schemas.microsoft.com/office/infopath/2007/PartnerControls">
+  <documentManagement/>
+</p:properties>
 </file>
 
 <file path=customXml/item2.xml><?xml version="1.0" encoding="utf-8"?>
@@ -5567,15 +5564,27 @@
 </file>
 
 <file path=customXml/item3.xml><?xml version="1.0" encoding="utf-8"?>
-<p:properties xmlns:p="http://schemas.microsoft.com/office/2006/metadata/properties" xmlns:xsi="http://www.w3.org/2001/XMLSchema-instance" xmlns:pc="http://schemas.microsoft.com/office/infopath/2007/PartnerControls">
-  <documentManagement/>
-</p:properties>
+<?mso-contentType ?>
+<FormTemplates xmlns="http://schemas.microsoft.com/sharepoint/v3/contenttype/forms">
+  <Display>DocumentLibraryForm</Display>
+  <Edit>DocumentLibraryForm</Edit>
+  <New>DocumentLibraryForm</New>
+</FormTemplates>
 </file>
 
 <file path=customXml/itemProps1.xml><?xml version="1.0" encoding="utf-8"?>
-<ds:datastoreItem xmlns:ds="http://schemas.openxmlformats.org/officeDocument/2006/customXml" ds:itemID="{23DDCE17-88C3-4032-A5F7-6798F0AF4B1E}">
+<ds:datastoreItem xmlns:ds="http://schemas.openxmlformats.org/officeDocument/2006/customXml" ds:itemID="{1AC6BCB7-BEDB-4B05-AA18-8351898859BF}">
   <ds:schemaRefs>
-    <ds:schemaRef ds:uri="http://schemas.microsoft.com/sharepoint/v3/contenttype/forms"/>
+    <ds:schemaRef ds:uri="http://purl.org/dc/elements/1.1/"/>
+    <ds:schemaRef ds:uri="http://schemas.microsoft.com/office/2006/metadata/properties"/>
+    <ds:schemaRef ds:uri="http://schemas.microsoft.com/office/2006/documentManagement/types"/>
+    <ds:schemaRef ds:uri="74cd053d-540d-4485-8ea1-05c7663abe95"/>
+    <ds:schemaRef ds:uri="http://purl.org/dc/terms/"/>
+    <ds:schemaRef ds:uri="http://schemas.openxmlformats.org/package/2006/metadata/core-properties"/>
+    <ds:schemaRef ds:uri="http://purl.org/dc/dcmitype/"/>
+    <ds:schemaRef ds:uri="bd6448f9-4a1c-4e61-8c75-19c935a45542"/>
+    <ds:schemaRef ds:uri="http://schemas.microsoft.com/office/infopath/2007/PartnerControls"/>
+    <ds:schemaRef ds:uri="http://www.w3.org/XML/1998/namespace"/>
   </ds:schemaRefs>
 </ds:datastoreItem>
 </file>
@@ -5600,18 +5609,9 @@
 </file>
 
 <file path=customXml/itemProps3.xml><?xml version="1.0" encoding="utf-8"?>
-<ds:datastoreItem xmlns:ds="http://schemas.openxmlformats.org/officeDocument/2006/customXml" ds:itemID="{1AC6BCB7-BEDB-4B05-AA18-8351898859BF}">
+<ds:datastoreItem xmlns:ds="http://schemas.openxmlformats.org/officeDocument/2006/customXml" ds:itemID="{23DDCE17-88C3-4032-A5F7-6798F0AF4B1E}">
   <ds:schemaRefs>
-    <ds:schemaRef ds:uri="http://purl.org/dc/elements/1.1/"/>
-    <ds:schemaRef ds:uri="http://schemas.microsoft.com/office/2006/metadata/properties"/>
-    <ds:schemaRef ds:uri="http://schemas.microsoft.com/office/2006/documentManagement/types"/>
-    <ds:schemaRef ds:uri="74cd053d-540d-4485-8ea1-05c7663abe95"/>
-    <ds:schemaRef ds:uri="http://purl.org/dc/terms/"/>
-    <ds:schemaRef ds:uri="http://schemas.openxmlformats.org/package/2006/metadata/core-properties"/>
-    <ds:schemaRef ds:uri="http://purl.org/dc/dcmitype/"/>
-    <ds:schemaRef ds:uri="bd6448f9-4a1c-4e61-8c75-19c935a45542"/>
-    <ds:schemaRef ds:uri="http://schemas.microsoft.com/office/infopath/2007/PartnerControls"/>
-    <ds:schemaRef ds:uri="http://www.w3.org/XML/1998/namespace"/>
+    <ds:schemaRef ds:uri="http://schemas.microsoft.com/sharepoint/v3/contenttype/forms"/>
   </ds:schemaRefs>
 </ds:datastoreItem>
 </file>
</xml_diff>